<commit_message>
Touched up the slides,
</commit_message>
<xml_diff>
--- a/reports/2020_shumko_agu_q&a.pptx
+++ b/reports/2020_shumko_agu_q&a.pptx
@@ -109,6 +109,11 @@
       </a:defRPr>
     </a:lvl9pPr>
   </p:defaultTextStyle>
+  <p:extLst>
+    <p:ext uri="{EFAFB233-063F-42B5-8137-9DF3F51BA10A}">
+      <p15:sldGuideLst xmlns:p15="http://schemas.microsoft.com/office/powerpoint/2012/main"/>
+    </p:ext>
+  </p:extLst>
 </p:presentation>
 </file>
 
@@ -3805,7 +3810,7 @@
         </p:blipFill>
         <p:spPr>
           <a:xfrm>
-            <a:off x="7403690" y="273651"/>
+            <a:off x="7299487" y="3167175"/>
             <a:ext cx="4306104" cy="2984455"/>
           </a:xfrm>
           <a:prstGeom prst="rect">
@@ -4000,7 +4005,7 @@
         </p:blipFill>
         <p:spPr>
           <a:xfrm>
-            <a:off x="7284084" y="3258106"/>
+            <a:off x="7428696" y="136525"/>
             <a:ext cx="4450716" cy="2846388"/>
           </a:xfrm>
           <a:prstGeom prst="rect">
@@ -4378,8 +4383,28 @@
           <a:lstStyle/>
           <a:p>
             <a:r>
-              <a:rPr lang="en-US"/>
-              <a:t>Mykhaylo Shumko | SM023-08 | https://doi.org/10.1029/2020JA028462</a:t>
+              <a:rPr lang="en-US" dirty="0" err="1"/>
+              <a:t>Mykhaylo</a:t>
+            </a:r>
+            <a:r>
+              <a:rPr lang="en-US" dirty="0"/>
+              <a:t> </a:t>
+            </a:r>
+            <a:r>
+              <a:rPr lang="en-US" dirty="0" err="1"/>
+              <a:t>Shumko</a:t>
+            </a:r>
+            <a:r>
+              <a:rPr lang="en-US" dirty="0"/>
+              <a:t> | SM023-08 | https://</a:t>
+            </a:r>
+            <a:r>
+              <a:rPr lang="en-US" dirty="0" err="1"/>
+              <a:t>doi.org</a:t>
+            </a:r>
+            <a:r>
+              <a:rPr lang="en-US" dirty="0"/>
+              <a:t>/10.1029/2020JA028462</a:t>
             </a:r>
           </a:p>
         </p:txBody>
@@ -4456,8 +4481,8 @@
         </p:nvSpPr>
         <p:spPr>
           <a:xfrm>
-            <a:off x="462451" y="560304"/>
-            <a:ext cx="3991576" cy="4031873"/>
+            <a:off x="258417" y="966897"/>
+            <a:ext cx="4338712" cy="4278094"/>
           </a:xfrm>
           <a:prstGeom prst="rect">
             <a:avLst/>
@@ -4471,22 +4496,26 @@
           <a:lstStyle/>
           <a:p>
             <a:r>
-              <a:rPr lang="en-US" sz="3200" dirty="0"/>
-              <a:t>Surprisingly, we found curtains that continuously scattered into the atmosphere. Could </a:t>
-            </a:r>
-            <a:r>
-              <a:rPr lang="en-US" sz="3200"/>
-              <a:t>curtains be </a:t>
-            </a:r>
-            <a:r>
-              <a:rPr lang="en-US" sz="3200" dirty="0"/>
-              <a:t>related to </a:t>
-            </a:r>
-            <a:r>
-              <a:rPr lang="en-US" sz="3200"/>
-              <a:t>the aurora?</a:t>
-            </a:r>
+              <a:rPr lang="en-US" sz="2800" dirty="0"/>
+              <a:t>Surprisingly, we found curtains that continuously precipitated into the atmosphere. Could curtains be related to the aurora?</a:t>
+            </a:r>
+          </a:p>
+          <a:p>
             <a:endParaRPr lang="en-US" sz="3200" dirty="0"/>
+          </a:p>
+          <a:p>
+            <a:r>
+              <a:rPr lang="en-US" dirty="0"/>
+              <a:t>More details at: https://</a:t>
+            </a:r>
+            <a:r>
+              <a:rPr lang="en-US" dirty="0" err="1"/>
+              <a:t>doi.org</a:t>
+            </a:r>
+            <a:r>
+              <a:rPr lang="en-US" dirty="0"/>
+              <a:t>/10.1029/2020JA028462</a:t>
+            </a:r>
           </a:p>
           <a:p>
             <a:endParaRPr lang="en-US" sz="3200" b="1" dirty="0"/>

</xml_diff>

<commit_message>
Made slight changes to the presentation.
</commit_message>
<xml_diff>
--- a/reports/2020_shumko_agu_q&a.pptx
+++ b/reports/2020_shumko_agu_q&a.pptx
@@ -4042,19 +4042,21 @@
           <a:lstStyle/>
           <a:p>
             <a:r>
-              <a:rPr lang="en-US" sz="2400" b="1" dirty="0"/>
-              <a:t>Motivation:</a:t>
-            </a:r>
-            <a:endParaRPr lang="en-US" sz="2400" dirty="0"/>
-          </a:p>
-          <a:p>
-            <a:r>
               <a:rPr lang="en-US" sz="2400" i="1" dirty="0"/>
               <a:t>Blake and O’Brien 2016</a:t>
             </a:r>
             <a:r>
               <a:rPr lang="en-US" sz="2400" dirty="0"/>
-              <a:t> discovered a latitudinally narrow and stationary form of precipitation with an unknown structure and origin. Nothing is known about the curtain impact on the atmosphere and the magnetosphere.</a:t>
+              <a:t> discovered curtains: a latitudinally narrow and stationary form of precipitation with mysterious physical shape, statistical properties, and origin. </a:t>
+            </a:r>
+          </a:p>
+          <a:p>
+            <a:endParaRPr lang="en-US" sz="2400" dirty="0"/>
+          </a:p>
+          <a:p>
+            <a:r>
+              <a:rPr lang="en-US" sz="2400" dirty="0"/>
+              <a:t>We investigated their statistical properties and began to unravel their mysterious origin.</a:t>
             </a:r>
           </a:p>
         </p:txBody>
@@ -4481,7 +4483,7 @@
         </p:nvSpPr>
         <p:spPr>
           <a:xfrm>
-            <a:off x="258417" y="966897"/>
+            <a:off x="259714" y="966897"/>
             <a:ext cx="4338712" cy="4278094"/>
           </a:xfrm>
           <a:prstGeom prst="rect">

</xml_diff>